<commit_message>
03. Built-in functions - Lab
</commit_message>
<xml_diff>
--- a/03. Built-in functions/03. DB-Basics-Built-in-functions.pptx
+++ b/03. Built-in functions/03. DB-Basics-Built-in-functions.pptx
@@ -260,10 +260,6 @@
 </p:presentation>
 </file>
 
-<file path=ppt/revisionInfo.xml><?xml version="1.0" encoding="utf-8"?>
-<p1510:revInfo xmlns:a="http://schemas.openxmlformats.org/drawingml/2006/main" xmlns:r="http://schemas.openxmlformats.org/officeDocument/2006/relationships" xmlns:p1510="http://schemas.microsoft.com/office/powerpoint/2015/10/main"/>
-</file>
-
 <file path=ppt/handoutMasters/handoutMaster1.xml><?xml version="1.0" encoding="utf-8"?>
 <p:handoutMaster xmlns:a="http://schemas.openxmlformats.org/drawingml/2006/main" xmlns:r="http://schemas.openxmlformats.org/officeDocument/2006/relationships" xmlns:p="http://schemas.openxmlformats.org/presentationml/2006/main">
   <p:cSld>
@@ -347,7 +343,7 @@
             <a:fld id="{FE5B4EDC-59C0-49C7-8ADA-5A781B329E02}" type="datetimeFigureOut">
               <a:rPr lang="en-US"/>
               <a:pPr/>
-              <a:t>5/21/2018</a:t>
+              <a:t>11/23/2018</a:t>
             </a:fld>
             <a:endParaRPr dirty="0"/>
           </a:p>
@@ -546,7 +542,7 @@
             <a:fld id="{F2D8D46A-B586-417D-BFBD-8C8FE0AAF762}" type="datetimeFigureOut">
               <a:rPr lang="en-US" smtClean="0"/>
               <a:pPr/>
-              <a:t>5/21/2018</a:t>
+              <a:t>11/23/2018</a:t>
             </a:fld>
             <a:endParaRPr lang="en-US" dirty="0"/>
           </a:p>
@@ -2429,7 +2425,7 @@
             <a:fld id="{055373AC-9AA7-423B-BA00-BA1C74164DBD}" type="datetime1">
               <a:rPr lang="en-US" smtClean="0"/>
               <a:pPr/>
-              <a:t>5/21/2018</a:t>
+              <a:t>11/23/2018</a:t>
             </a:fld>
             <a:endParaRPr lang="en-US" dirty="0"/>
           </a:p>
@@ -4238,7 +4234,7 @@
             <a:fld id="{055373AC-9AA7-423B-BA00-BA1C74164DBD}" type="datetime1">
               <a:rPr lang="en-US" smtClean="0"/>
               <a:pPr/>
-              <a:t>5/21/2018</a:t>
+              <a:t>11/23/2018</a:t>
             </a:fld>
             <a:endParaRPr lang="en-US" dirty="0"/>
           </a:p>
@@ -5262,13 +5258,6 @@
   <p:clrMapOvr>
     <a:masterClrMapping/>
   </p:clrMapOvr>
-  <p:timing>
-    <p:tnLst>
-      <p:par>
-        <p:cTn id="1" dur="indefinite" restart="never" nodeType="tmRoot"/>
-      </p:par>
-    </p:tnLst>
-  </p:timing>
 </p:sld>
 </file>
 
@@ -5388,10 +5377,6 @@
             <a:br>
               <a:rPr lang="en-US" dirty="0"/>
             </a:br>
-            <a:r>
-              <a:rPr lang="en-US" dirty="0"/>
-              <a:t/>
-            </a:r>
             <a:br>
               <a:rPr lang="en-US" dirty="0"/>
             </a:br>
@@ -5436,10 +5421,6 @@
                 </a:solidFill>
               </a:rPr>
               <a:t>number of characters</a:t>
-            </a:r>
-            <a:r>
-              <a:rPr lang="en-US" dirty="0"/>
-              <a:t/>
             </a:r>
             <a:br>
               <a:rPr lang="en-US" dirty="0"/>
@@ -5728,7 +5709,7 @@
         </p:nvGrpSpPr>
         <p:grpSpPr>
           <a:xfrm>
-            <a:off x="3122612" y="1907404"/>
+            <a:off x="3122612" y="1981200"/>
             <a:ext cx="5943600" cy="1085237"/>
             <a:chOff x="1217612" y="2023128"/>
             <a:chExt cx="4114800" cy="1085237"/>
@@ -6295,17 +6276,9 @@
             <a:br>
               <a:rPr lang="en-US" dirty="0"/>
             </a:br>
-            <a:r>
-              <a:rPr lang="en-US" dirty="0"/>
-              <a:t/>
-            </a:r>
             <a:br>
               <a:rPr lang="en-US" dirty="0"/>
             </a:br>
-            <a:r>
-              <a:rPr lang="en-US" dirty="0"/>
-              <a:t/>
-            </a:r>
             <a:br>
               <a:rPr lang="en-US" dirty="0"/>
             </a:br>
@@ -10965,24 +10938,12 @@
             <a:br>
               <a:rPr lang="en-US" dirty="0"/>
             </a:br>
-            <a:r>
-              <a:rPr lang="en-US" dirty="0"/>
-              <a:t/>
-            </a:r>
             <a:br>
               <a:rPr lang="en-US" dirty="0"/>
             </a:br>
-            <a:r>
-              <a:rPr lang="en-US" dirty="0"/>
-              <a:t/>
-            </a:r>
             <a:br>
               <a:rPr lang="en-US" dirty="0"/>
             </a:br>
-            <a:r>
-              <a:rPr lang="en-US" dirty="0"/>
-              <a:t/>
-            </a:r>
             <a:br>
               <a:rPr lang="en-US" dirty="0"/>
             </a:br>
@@ -11969,10 +11930,6 @@
             <a:br>
               <a:rPr lang="en-US" dirty="0"/>
             </a:br>
-            <a:r>
-              <a:rPr lang="en-US" dirty="0"/>
-              <a:t/>
-            </a:r>
             <a:br>
               <a:rPr lang="en-US" dirty="0"/>
             </a:br>
@@ -12830,17 +12787,9 @@
             <a:br>
               <a:rPr lang="en-US" dirty="0"/>
             </a:br>
-            <a:r>
-              <a:rPr lang="en-US" dirty="0"/>
-              <a:t/>
-            </a:r>
             <a:br>
               <a:rPr lang="en-US" dirty="0"/>
             </a:br>
-            <a:r>
-              <a:rPr lang="en-US" dirty="0"/>
-              <a:t/>
-            </a:r>
             <a:br>
               <a:rPr lang="en-US" dirty="0"/>
             </a:br>
@@ -13642,13 +13591,6 @@
   <p:clrMapOvr>
     <a:masterClrMapping/>
   </p:clrMapOvr>
-  <p:timing>
-    <p:tnLst>
-      <p:par>
-        <p:cTn id="1" dur="indefinite" restart="never" nodeType="tmRoot"/>
-      </p:par>
-    </p:tnLst>
-  </p:timing>
 </p:sld>
 </file>
 
@@ -14686,7 +14628,7 @@
         </p:nvSpPr>
         <p:spPr bwMode="auto">
           <a:xfrm>
-            <a:off x="2894012" y="4658398"/>
+            <a:off x="2892424" y="4658398"/>
             <a:ext cx="6400800" cy="544765"/>
           </a:xfrm>
           <a:prstGeom prst="rect">
@@ -18493,10 +18435,6 @@
             <a:br>
               <a:rPr lang="en-US" dirty="0"/>
             </a:br>
-            <a:r>
-              <a:rPr lang="en-US" dirty="0"/>
-              <a:t/>
-            </a:r>
             <a:br>
               <a:rPr lang="en-US" dirty="0"/>
             </a:br>
@@ -18720,10 +18658,10 @@
         </p:nvGrpSpPr>
         <p:grpSpPr>
           <a:xfrm>
-            <a:off x="2894012" y="4549270"/>
-            <a:ext cx="6400800" cy="1089530"/>
-            <a:chOff x="2894012" y="4549270"/>
-            <a:chExt cx="6400800" cy="1089530"/>
+            <a:off x="2892424" y="4533887"/>
+            <a:ext cx="6402388" cy="1104913"/>
+            <a:chOff x="2892424" y="4533887"/>
+            <a:chExt cx="6402388" cy="1104913"/>
           </a:xfrm>
         </p:grpSpPr>
         <p:sp>
@@ -18736,7 +18674,7 @@
           </p:nvSpPr>
           <p:spPr bwMode="auto">
             <a:xfrm>
-              <a:off x="2894012" y="4549270"/>
+              <a:off x="2892424" y="4533887"/>
               <a:ext cx="6400800" cy="544765"/>
             </a:xfrm>
             <a:prstGeom prst="rect">
@@ -19218,13 +19156,6 @@
   <p:clrMapOvr>
     <a:masterClrMapping/>
   </p:clrMapOvr>
-  <p:timing>
-    <p:tnLst>
-      <p:par>
-        <p:cTn id="1" dur="indefinite" restart="never" nodeType="tmRoot"/>
-      </p:par>
-    </p:tnLst>
-  </p:timing>
 </p:sld>
 </file>
 
@@ -19341,45 +19272,21 @@
             <a:br>
               <a:rPr lang="en-US" dirty="0"/>
             </a:br>
-            <a:r>
-              <a:rPr lang="en-US" dirty="0"/>
-              <a:t/>
-            </a:r>
             <a:br>
               <a:rPr lang="en-US" dirty="0"/>
             </a:br>
-            <a:r>
-              <a:rPr lang="en-US" dirty="0"/>
-              <a:t/>
-            </a:r>
             <a:br>
               <a:rPr lang="en-US" dirty="0"/>
             </a:br>
-            <a:r>
-              <a:rPr lang="en-US" dirty="0"/>
-              <a:t/>
-            </a:r>
             <a:br>
               <a:rPr lang="en-US" dirty="0"/>
             </a:br>
-            <a:r>
-              <a:rPr lang="en-US" dirty="0"/>
-              <a:t/>
-            </a:r>
             <a:br>
               <a:rPr lang="en-US" dirty="0"/>
             </a:br>
-            <a:r>
-              <a:rPr lang="en-US" dirty="0"/>
-              <a:t/>
-            </a:r>
             <a:br>
               <a:rPr lang="en-US" dirty="0"/>
             </a:br>
-            <a:r>
-              <a:rPr lang="en-US" dirty="0"/>
-              <a:t/>
-            </a:r>
             <a:br>
               <a:rPr lang="en-US" dirty="0"/>
             </a:br>
@@ -20908,45 +20815,21 @@
             <a:br>
               <a:rPr lang="en-US" dirty="0"/>
             </a:br>
-            <a:r>
-              <a:rPr lang="en-US" dirty="0"/>
-              <a:t/>
-            </a:r>
             <a:br>
               <a:rPr lang="en-US" dirty="0"/>
             </a:br>
-            <a:r>
-              <a:rPr lang="en-US" dirty="0"/>
-              <a:t/>
-            </a:r>
             <a:br>
               <a:rPr lang="en-US" dirty="0"/>
             </a:br>
-            <a:r>
-              <a:rPr lang="en-US" dirty="0"/>
-              <a:t/>
-            </a:r>
             <a:br>
               <a:rPr lang="en-US" dirty="0"/>
             </a:br>
-            <a:r>
-              <a:rPr lang="en-US" dirty="0"/>
-              <a:t/>
-            </a:r>
             <a:br>
               <a:rPr lang="en-US" dirty="0"/>
             </a:br>
-            <a:r>
-              <a:rPr lang="en-US" dirty="0"/>
-              <a:t/>
-            </a:r>
             <a:br>
               <a:rPr lang="en-US" dirty="0"/>
             </a:br>
-            <a:r>
-              <a:rPr lang="en-US" dirty="0"/>
-              <a:t/>
-            </a:r>
             <a:br>
               <a:rPr lang="en-US" dirty="0"/>
             </a:br>
@@ -21837,10 +21720,6 @@
             <a:br>
               <a:rPr lang="en-US" dirty="0"/>
             </a:br>
-            <a:r>
-              <a:rPr lang="en-US" dirty="0"/>
-              <a:t/>
-            </a:r>
             <a:br>
               <a:rPr lang="en-US" dirty="0"/>
             </a:br>
@@ -22423,10 +22302,6 @@
             <a:br>
               <a:rPr lang="en-US" dirty="0"/>
             </a:br>
-            <a:r>
-              <a:rPr lang="en-US" dirty="0"/>
-              <a:t/>
-            </a:r>
             <a:br>
               <a:rPr lang="en-US" dirty="0"/>
             </a:br>
@@ -23350,10 +23225,6 @@
               </a:rPr>
               <a:t>sli.do</a:t>
             </a:r>
-            <a:r>
-              <a:rPr lang="en-US" sz="6000" b="1" dirty="0"/>
-              <a:t/>
-            </a:r>
             <a:br>
               <a:rPr lang="en-US" sz="6000" b="1" dirty="0"/>
             </a:br>
@@ -23404,13 +23275,6 @@
   <p:clrMapOvr>
     <a:masterClrMapping/>
   </p:clrMapOvr>
-  <p:timing>
-    <p:tnLst>
-      <p:par>
-        <p:cTn id="1" dur="indefinite" restart="never" nodeType="tmRoot"/>
-      </p:par>
-    </p:tnLst>
-  </p:timing>
 </p:sld>
 </file>
 
@@ -23591,13 +23455,6 @@
   <p:clrMapOvr>
     <a:masterClrMapping/>
   </p:clrMapOvr>
-  <p:timing>
-    <p:tnLst>
-      <p:par>
-        <p:cTn id="1" dur="indefinite" restart="never" nodeType="tmRoot"/>
-      </p:par>
-    </p:tnLst>
-  </p:timing>
 </p:sld>
 </file>
 
@@ -23684,10 +23541,6 @@
             <a:br>
               <a:rPr lang="en-US" dirty="0"/>
             </a:br>
-            <a:r>
-              <a:rPr lang="en-US" dirty="0"/>
-              <a:t/>
-            </a:r>
             <a:br>
               <a:rPr lang="en-US" dirty="0"/>
             </a:br>
@@ -25631,13 +25484,6 @@
   <p:clrMapOvr>
     <a:masterClrMapping/>
   </p:clrMapOvr>
-  <p:timing>
-    <p:tnLst>
-      <p:par>
-        <p:cTn id="1" dur="indefinite" restart="never" nodeType="tmRoot"/>
-      </p:par>
-    </p:tnLst>
-  </p:timing>
 </p:sld>
 </file>
 
@@ -29103,13 +28949,6 @@
   <p:clrMapOvr>
     <a:masterClrMapping/>
   </p:clrMapOvr>
-  <p:timing>
-    <p:tnLst>
-      <p:par>
-        <p:cTn id="1" dur="indefinite" restart="never" nodeType="tmRoot"/>
-      </p:par>
-    </p:tnLst>
-  </p:timing>
 </p:sld>
 </file>
 
@@ -29373,13 +29212,6 @@
   <p:clrMapOvr>
     <a:masterClrMapping/>
   </p:clrMapOvr>
-  <p:timing>
-    <p:tnLst>
-      <p:par>
-        <p:cTn id="1" dur="indefinite" restart="never" nodeType="tmRoot"/>
-      </p:par>
-    </p:tnLst>
-  </p:timing>
 </p:sld>
 </file>
 
@@ -29772,13 +29604,6 @@
   <p:clrMapOvr>
     <a:masterClrMapping/>
   </p:clrMapOvr>
-  <p:timing>
-    <p:tnLst>
-      <p:par>
-        <p:cTn id="1" dur="indefinite" restart="never" nodeType="tmRoot"/>
-      </p:par>
-    </p:tnLst>
-  </p:timing>
 </p:sld>
 </file>
 
@@ -30473,13 +30298,6 @@
   <p:clrMapOvr>
     <a:masterClrMapping/>
   </p:clrMapOvr>
-  <p:timing>
-    <p:tnLst>
-      <p:par>
-        <p:cTn id="1" dur="indefinite" restart="never" nodeType="tmRoot"/>
-      </p:par>
-    </p:tnLst>
-  </p:timing>
 </p:sld>
 </file>
 
@@ -30546,45 +30364,21 @@
             <a:br>
               <a:rPr lang="en-US" dirty="0"/>
             </a:br>
-            <a:r>
-              <a:rPr lang="en-US" dirty="0"/>
-              <a:t/>
-            </a:r>
             <a:br>
               <a:rPr lang="en-US" dirty="0"/>
             </a:br>
-            <a:r>
-              <a:rPr lang="en-US" dirty="0"/>
-              <a:t/>
-            </a:r>
             <a:br>
               <a:rPr lang="en-US" dirty="0"/>
             </a:br>
-            <a:r>
-              <a:rPr lang="en-US" dirty="0"/>
-              <a:t/>
-            </a:r>
             <a:br>
               <a:rPr lang="en-US" dirty="0"/>
             </a:br>
-            <a:r>
-              <a:rPr lang="en-US" dirty="0"/>
-              <a:t/>
-            </a:r>
             <a:br>
               <a:rPr lang="en-US" dirty="0"/>
             </a:br>
-            <a:r>
-              <a:rPr lang="en-US" dirty="0"/>
-              <a:t/>
-            </a:r>
             <a:br>
               <a:rPr lang="en-US" dirty="0"/>
             </a:br>
-            <a:r>
-              <a:rPr lang="en-US" dirty="0"/>
-              <a:t/>
-            </a:r>
             <a:br>
               <a:rPr lang="en-US" dirty="0"/>
             </a:br>
@@ -30629,7 +30423,7 @@
             </a:r>
             <a:r>
               <a:rPr lang="en-US" dirty="0"/>
-              <a:t> values it with empty string</a:t>
+              <a:t> values with empty string</a:t>
             </a:r>
           </a:p>
         </p:txBody>
@@ -30896,7 +30690,7 @@
           <a:p>
             <a:r>
               <a:rPr lang="en-US" sz="2800" dirty="0"/>
-              <a:t>  FROM Employee</a:t>
+              <a:t>  FROM Employees</a:t>
             </a:r>
           </a:p>
         </p:txBody>
@@ -31129,7 +30923,7 @@
           <a:p>
             <a:r>
               <a:rPr lang="en-US" sz="2800" dirty="0"/>
-              <a:t>  FROM Employee</a:t>
+              <a:t>  FROM Employees</a:t>
             </a:r>
           </a:p>
         </p:txBody>
@@ -31388,17 +31182,9 @@
             <a:br>
               <a:rPr lang="en-US" dirty="0"/>
             </a:br>
-            <a:r>
-              <a:rPr lang="en-US" dirty="0"/>
-              <a:t/>
-            </a:r>
             <a:br>
               <a:rPr lang="en-US" dirty="0"/>
             </a:br>
-            <a:r>
-              <a:rPr lang="en-US" dirty="0"/>
-              <a:t/>
-            </a:r>
             <a:br>
               <a:rPr lang="en-US" dirty="0"/>
             </a:br>
@@ -32342,17 +32128,9 @@
             <a:br>
               <a:rPr lang="en-US" dirty="0"/>
             </a:br>
-            <a:r>
-              <a:rPr lang="en-US" dirty="0"/>
-              <a:t/>
-            </a:r>
             <a:br>
               <a:rPr lang="en-US" dirty="0"/>
             </a:br>
-            <a:r>
-              <a:rPr lang="en-US" dirty="0"/>
-              <a:t/>
-            </a:r>
             <a:br>
               <a:rPr lang="en-US" dirty="0"/>
             </a:br>

</xml_diff>